<commit_message>
Update 02 EDABDC - Data Models - part 2.pptx
</commit_message>
<xml_diff>
--- a/PPT slides/02 EDABDC - Data Models - part 2.pptx
+++ b/PPT slides/02 EDABDC - Data Models - part 2.pptx
@@ -45,7 +45,16 @@
     <p:sldId id="494" r:id="rId38"/>
     <p:sldId id="535" r:id="rId39"/>
     <p:sldId id="536" r:id="rId40"/>
-    <p:sldId id="264" r:id="rId41"/>
+    <p:sldId id="548" r:id="rId41"/>
+    <p:sldId id="549" r:id="rId42"/>
+    <p:sldId id="550" r:id="rId43"/>
+    <p:sldId id="551" r:id="rId44"/>
+    <p:sldId id="552" r:id="rId45"/>
+    <p:sldId id="556" r:id="rId46"/>
+    <p:sldId id="558" r:id="rId47"/>
+    <p:sldId id="553" r:id="rId48"/>
+    <p:sldId id="555" r:id="rId49"/>
+    <p:sldId id="264" r:id="rId50"/>
   </p:sldIdLst>
   <p:sldSz cx="12192000" cy="6858000"/>
   <p:notesSz cx="6858000" cy="9144000"/>
@@ -538,6 +547,54 @@
 </p:notes>
 </file>
 
+<file path=ppt/notesSlides/notesSlide2.xml><?xml version="1.0" encoding="utf-8"?>
+<p:notes xmlns:a="http://schemas.openxmlformats.org/drawingml/2006/main" xmlns:r="http://schemas.openxmlformats.org/officeDocument/2006/relationships" xmlns:p="http://schemas.openxmlformats.org/presentationml/2006/main">
+  <p:cSld>
+    <p:spTree>
+      <p:nvGrpSpPr>
+        <p:cNvPr id="1" name=""/>
+        <p:cNvGrpSpPr/>
+        <p:nvPr/>
+      </p:nvGrpSpPr>
+      <p:grpSpPr/>
+      <p:sp>
+        <p:nvSpPr>
+          <p:cNvPr id="2" name="Slide Image Placeholder 1"/>
+          <p:cNvSpPr>
+            <a:spLocks noGrp="1"/>
+          </p:cNvSpPr>
+          <p:nvPr>
+            <p:ph type="sldImg" idx="2"/>
+          </p:nvPr>
+        </p:nvSpPr>
+        <p:spPr/>
+      </p:sp>
+      <p:sp>
+        <p:nvSpPr>
+          <p:cNvPr id="3" name="Text Placeholder 2"/>
+          <p:cNvSpPr>
+            <a:spLocks noGrp="1"/>
+          </p:cNvSpPr>
+          <p:nvPr>
+            <p:ph type="body" idx="3"/>
+          </p:nvPr>
+        </p:nvSpPr>
+        <p:spPr/>
+        <p:txBody>
+          <a:bodyPr/>
+          <a:p>
+            <a:endParaRPr lang="en-GB" altLang="en-US"/>
+          </a:p>
+        </p:txBody>
+      </p:sp>
+    </p:spTree>
+  </p:cSld>
+  <p:clrMapOvr>
+    <a:masterClrMapping/>
+  </p:clrMapOvr>
+</p:notes>
+</file>
+
 <file path=ppt/slideLayouts/slideLayout1.xml><?xml version="1.0" encoding="utf-8"?>
 <p:sldLayout xmlns:a="http://schemas.openxmlformats.org/drawingml/2006/main" xmlns:r="http://schemas.openxmlformats.org/officeDocument/2006/relationships" xmlns:p="http://schemas.openxmlformats.org/presentationml/2006/main" type="title" preserve="1">
   <p:cSld name="Title Slide">
@@ -953,6 +1010,173 @@
         </p:spPr>
         <p:txBody>
           <a:bodyPr vert="eaVert"/>
+          <a:lstStyle/>
+          <a:p>
+            <a:pPr lvl="0"/>
+            <a:r>
+              <a:rPr lang="en-US" smtClean="0"/>
+              <a:t>Click to edit Master text styles</a:t>
+            </a:r>
+            <a:endParaRPr lang="en-US" smtClean="0"/>
+          </a:p>
+          <a:p>
+            <a:pPr lvl="1"/>
+            <a:r>
+              <a:rPr lang="en-US" smtClean="0"/>
+              <a:t>Second level</a:t>
+            </a:r>
+            <a:endParaRPr lang="en-US" smtClean="0"/>
+          </a:p>
+          <a:p>
+            <a:pPr lvl="2"/>
+            <a:r>
+              <a:rPr lang="en-US" smtClean="0"/>
+              <a:t>Third level</a:t>
+            </a:r>
+            <a:endParaRPr lang="en-US" smtClean="0"/>
+          </a:p>
+          <a:p>
+            <a:pPr lvl="3"/>
+            <a:r>
+              <a:rPr lang="en-US" smtClean="0"/>
+              <a:t>Fourth level</a:t>
+            </a:r>
+            <a:endParaRPr lang="en-US" smtClean="0"/>
+          </a:p>
+          <a:p>
+            <a:pPr lvl="4"/>
+            <a:r>
+              <a:rPr lang="en-US" smtClean="0"/>
+              <a:t>Fifth level</a:t>
+            </a:r>
+            <a:endParaRPr lang="en-US"/>
+          </a:p>
+        </p:txBody>
+      </p:sp>
+      <p:sp>
+        <p:nvSpPr>
+          <p:cNvPr id="4" name="Date Placeholder 3"/>
+          <p:cNvSpPr>
+            <a:spLocks noGrp="1"/>
+          </p:cNvSpPr>
+          <p:nvPr>
+            <p:ph type="dt" sz="half" idx="10"/>
+          </p:nvPr>
+        </p:nvSpPr>
+        <p:spPr/>
+        <p:txBody>
+          <a:bodyPr/>
+          <a:lstStyle/>
+          <a:p>
+            <a:fld id="{63A1C593-65D0-4073-BCC9-577B9352EA97}" type="datetimeFigureOut">
+              <a:rPr lang="en-US" smtClean="0"/>
+            </a:fld>
+            <a:endParaRPr lang="en-US"/>
+          </a:p>
+        </p:txBody>
+      </p:sp>
+      <p:sp>
+        <p:nvSpPr>
+          <p:cNvPr id="5" name="Footer Placeholder 4"/>
+          <p:cNvSpPr>
+            <a:spLocks noGrp="1"/>
+          </p:cNvSpPr>
+          <p:nvPr>
+            <p:ph type="ftr" sz="quarter" idx="11"/>
+          </p:nvPr>
+        </p:nvSpPr>
+        <p:spPr/>
+        <p:txBody>
+          <a:bodyPr/>
+          <a:lstStyle/>
+          <a:p>
+            <a:endParaRPr lang="en-US"/>
+          </a:p>
+        </p:txBody>
+      </p:sp>
+      <p:sp>
+        <p:nvSpPr>
+          <p:cNvPr id="6" name="Slide Number Placeholder 5"/>
+          <p:cNvSpPr>
+            <a:spLocks noGrp="1"/>
+          </p:cNvSpPr>
+          <p:nvPr>
+            <p:ph type="sldNum" sz="quarter" idx="12"/>
+          </p:nvPr>
+        </p:nvSpPr>
+        <p:spPr/>
+        <p:txBody>
+          <a:bodyPr/>
+          <a:lstStyle/>
+          <a:p>
+            <a:fld id="{9B618960-8005-486C-9A75-10CB2AAC16F9}" type="slidenum">
+              <a:rPr lang="en-US" smtClean="0"/>
+            </a:fld>
+            <a:endParaRPr lang="en-US"/>
+          </a:p>
+        </p:txBody>
+      </p:sp>
+    </p:spTree>
+  </p:cSld>
+  <p:clrMapOvr>
+    <a:masterClrMapping/>
+  </p:clrMapOvr>
+</p:sldLayout>
+</file>
+
+<file path=ppt/slideLayouts/slideLayout12.xml><?xml version="1.0" encoding="utf-8"?>
+<p:sldLayout xmlns:a="http://schemas.openxmlformats.org/drawingml/2006/main" xmlns:r="http://schemas.openxmlformats.org/officeDocument/2006/relationships" xmlns:p="http://schemas.openxmlformats.org/presentationml/2006/main" type="tx" preserve="1">
+  <p:cSld name="Title and Text">
+    <p:spTree>
+      <p:nvGrpSpPr>
+        <p:cNvPr id="1" name=""/>
+        <p:cNvGrpSpPr/>
+        <p:nvPr/>
+      </p:nvGrpSpPr>
+      <p:grpSpPr>
+        <a:xfrm>
+          <a:off x="0" y="0"/>
+          <a:ext cx="0" cy="0"/>
+          <a:chOff x="0" y="0"/>
+          <a:chExt cx="0" cy="0"/>
+        </a:xfrm>
+      </p:grpSpPr>
+      <p:sp>
+        <p:nvSpPr>
+          <p:cNvPr id="2" name="Title 1"/>
+          <p:cNvSpPr>
+            <a:spLocks noGrp="1"/>
+          </p:cNvSpPr>
+          <p:nvPr>
+            <p:ph type="title"/>
+          </p:nvPr>
+        </p:nvSpPr>
+        <p:spPr/>
+        <p:txBody>
+          <a:bodyPr/>
+          <a:lstStyle/>
+          <a:p>
+            <a:r>
+              <a:rPr lang="en-US" smtClean="0"/>
+              <a:t>Click to edit Master title style</a:t>
+            </a:r>
+            <a:endParaRPr lang="en-US"/>
+          </a:p>
+        </p:txBody>
+      </p:sp>
+      <p:sp>
+        <p:nvSpPr>
+          <p:cNvPr id="3" name="Text Placeholder 2"/>
+          <p:cNvSpPr>
+            <a:spLocks noGrp="1"/>
+          </p:cNvSpPr>
+          <p:nvPr>
+            <p:ph type="body" idx="1"/>
+          </p:nvPr>
+        </p:nvSpPr>
+        <p:spPr/>
+        <p:txBody>
+          <a:bodyPr/>
           <a:lstStyle/>
           <a:p>
             <a:pPr lvl="0"/>
@@ -3051,6 +3275,7 @@
     <p:sldLayoutId id="2147483657" r:id="rId9"/>
     <p:sldLayoutId id="2147483658" r:id="rId10"/>
     <p:sldLayoutId id="2147483659" r:id="rId11"/>
+    <p:sldLayoutId id="2147483660" r:id="rId12"/>
   </p:sldLayoutIdLst>
   <p:txStyles>
     <p:titleStyle>
@@ -7408,6 +7633,1010 @@
         </p:nvSpPr>
         <p:spPr/>
         <p:txBody>
+          <a:bodyPr>
+            <a:normAutofit/>
+          </a:bodyPr>
+          <a:p>
+            <a:r>
+              <a:rPr lang="en-US" altLang="en-GB"/>
+              <a:t>Basic Querying</a:t>
+            </a:r>
+            <a:endParaRPr lang="en-US" altLang="en-GB"/>
+          </a:p>
+        </p:txBody>
+      </p:sp>
+      <p:sp>
+        <p:nvSpPr>
+          <p:cNvPr id="3" name="Content Placeholder 2"/>
+          <p:cNvSpPr>
+            <a:spLocks noGrp="1"/>
+          </p:cNvSpPr>
+          <p:nvPr>
+            <p:ph idx="1"/>
+          </p:nvPr>
+        </p:nvSpPr>
+        <p:spPr/>
+        <p:txBody>
+          <a:bodyPr/>
+          <a:p>
+            <a:r>
+              <a:rPr lang="en-US" altLang="en-GB"/>
+              <a:t>Load query for product nodes</a:t>
+            </a:r>
+            <a:endParaRPr lang="en-US" altLang="en-GB"/>
+          </a:p>
+          <a:p>
+            <a:pPr marL="0" indent="0">
+              <a:buNone/>
+            </a:pPr>
+            <a:endParaRPr lang="en-US" altLang="en-GB"/>
+          </a:p>
+          <a:p>
+            <a:pPr marL="0" indent="0">
+              <a:buNone/>
+            </a:pPr>
+            <a:r>
+              <a:rPr lang="en-US" altLang="en-GB"/>
+              <a:t>MATCH (n:Product)</a:t>
+            </a:r>
+            <a:endParaRPr lang="en-US" altLang="en-GB"/>
+          </a:p>
+          <a:p>
+            <a:pPr marL="0" indent="0">
+              <a:buNone/>
+            </a:pPr>
+            <a:r>
+              <a:rPr lang="en-US" altLang="en-GB"/>
+              <a:t>RETURN n</a:t>
+            </a:r>
+            <a:endParaRPr lang="en-US" altLang="en-GB"/>
+          </a:p>
+          <a:p>
+            <a:pPr marL="0" indent="0">
+              <a:buNone/>
+            </a:pPr>
+            <a:r>
+              <a:rPr lang="en-US" altLang="en-GB"/>
+              <a:t>LIMIT 25</a:t>
+            </a:r>
+            <a:endParaRPr lang="en-US" altLang="en-GB"/>
+          </a:p>
+        </p:txBody>
+      </p:sp>
+    </p:spTree>
+  </p:cSld>
+  <p:clrMapOvr>
+    <a:masterClrMapping/>
+  </p:clrMapOvr>
+</p:sld>
+</file>
+
+<file path=ppt/slides/slide39.xml><?xml version="1.0" encoding="utf-8"?>
+<p:sld xmlns:a="http://schemas.openxmlformats.org/drawingml/2006/main" xmlns:r="http://schemas.openxmlformats.org/officeDocument/2006/relationships" xmlns:p="http://schemas.openxmlformats.org/presentationml/2006/main">
+  <p:cSld>
+    <p:spTree>
+      <p:nvGrpSpPr>
+        <p:cNvPr id="1" name=""/>
+        <p:cNvGrpSpPr/>
+        <p:nvPr/>
+      </p:nvGrpSpPr>
+      <p:grpSpPr/>
+      <p:sp>
+        <p:nvSpPr>
+          <p:cNvPr id="2" name="Title 1"/>
+          <p:cNvSpPr>
+            <a:spLocks noGrp="1"/>
+          </p:cNvSpPr>
+          <p:nvPr>
+            <p:ph type="title"/>
+          </p:nvPr>
+        </p:nvSpPr>
+        <p:spPr/>
+        <p:txBody>
+          <a:bodyPr>
+            <a:normAutofit fontScale="90000"/>
+          </a:bodyPr>
+          <a:p>
+            <a:r>
+              <a:rPr lang="en-US" altLang="en-GB"/>
+              <a:t>All products ordered by a customer and who supplies those</a:t>
+            </a:r>
+            <a:endParaRPr lang="en-US" altLang="en-GB"/>
+          </a:p>
+        </p:txBody>
+      </p:sp>
+      <p:sp>
+        <p:nvSpPr>
+          <p:cNvPr id="3" name="Content Placeholder 2"/>
+          <p:cNvSpPr>
+            <a:spLocks noGrp="1"/>
+          </p:cNvSpPr>
+          <p:nvPr>
+            <p:ph idx="1"/>
+          </p:nvPr>
+        </p:nvSpPr>
+        <p:spPr/>
+        <p:txBody>
+          <a:bodyPr/>
+          <a:p>
+            <a:pPr marL="0" indent="0">
+              <a:buNone/>
+            </a:pPr>
+            <a:r>
+              <a:rPr lang="en-US" altLang="en-GB"/>
+              <a:t>MATCH path=(c:Customer)-[:PURCHASED]-&gt;()-[:ORDERS]-&gt;(:Product)&lt;-[:SUPPLIES]-(:Supplier)</a:t>
+            </a:r>
+            <a:endParaRPr lang="en-US" altLang="en-GB"/>
+          </a:p>
+          <a:p>
+            <a:pPr marL="0" indent="0">
+              <a:buNone/>
+            </a:pPr>
+            <a:r>
+              <a:rPr lang="en-US" altLang="en-GB"/>
+              <a:t>WHERE c.companyName = 'Blauer See Delikatessen'</a:t>
+            </a:r>
+            <a:endParaRPr lang="en-US" altLang="en-GB"/>
+          </a:p>
+          <a:p>
+            <a:pPr marL="0" indent="0">
+              <a:buNone/>
+            </a:pPr>
+            <a:r>
+              <a:rPr lang="en-US" altLang="en-GB"/>
+              <a:t>RETURN path;</a:t>
+            </a:r>
+            <a:endParaRPr lang="en-US" altLang="en-GB"/>
+          </a:p>
+        </p:txBody>
+      </p:sp>
+    </p:spTree>
+  </p:cSld>
+  <p:clrMapOvr>
+    <a:masterClrMapping/>
+  </p:clrMapOvr>
+</p:sld>
+</file>
+
+<file path=ppt/slides/slide4.xml><?xml version="1.0" encoding="utf-8"?>
+<p:sld xmlns:a="http://schemas.openxmlformats.org/drawingml/2006/main" xmlns:r="http://schemas.openxmlformats.org/officeDocument/2006/relationships" xmlns:p="http://schemas.openxmlformats.org/presentationml/2006/main">
+  <p:cSld>
+    <p:spTree>
+      <p:nvGrpSpPr>
+        <p:cNvPr id="1" name=""/>
+        <p:cNvGrpSpPr/>
+        <p:nvPr/>
+      </p:nvGrpSpPr>
+      <p:grpSpPr/>
+      <p:sp>
+        <p:nvSpPr>
+          <p:cNvPr id="2" name="Title 1"/>
+          <p:cNvSpPr>
+            <a:spLocks noGrp="1"/>
+          </p:cNvSpPr>
+          <p:nvPr>
+            <p:ph type="title"/>
+          </p:nvPr>
+        </p:nvSpPr>
+        <p:spPr/>
+        <p:txBody>
+          <a:bodyPr/>
+          <a:p>
+            <a:r>
+              <a:rPr lang="en-US">
+                <a:sym typeface="+mn-ea"/>
+              </a:rPr>
+              <a:t>Importance of Data Models</a:t>
+            </a:r>
+            <a:endParaRPr lang="en-US"/>
+          </a:p>
+        </p:txBody>
+      </p:sp>
+      <p:sp>
+        <p:nvSpPr>
+          <p:cNvPr id="3" name="Content Placeholder 2"/>
+          <p:cNvSpPr>
+            <a:spLocks noGrp="1"/>
+          </p:cNvSpPr>
+          <p:nvPr>
+            <p:ph idx="1"/>
+          </p:nvPr>
+        </p:nvSpPr>
+        <p:spPr>
+          <a:xfrm>
+            <a:off x="838200" y="1825625"/>
+            <a:ext cx="10929620" cy="4351655"/>
+          </a:xfrm>
+        </p:spPr>
+        <p:txBody>
+          <a:bodyPr>
+            <a:normAutofit lnSpcReduction="10000"/>
+          </a:bodyPr>
+          <a:p>
+            <a:r>
+              <a:rPr lang="en-US"/>
+              <a:t>Data Organization: Helps in organizing and structuring data efficiently.</a:t>
+            </a:r>
+            <a:endParaRPr lang="en-US"/>
+          </a:p>
+          <a:p>
+            <a:r>
+              <a:rPr lang="en-US"/>
+              <a:t>Data Integrity: Ensures the accuracy and consistency of data through constraints and rules.</a:t>
+            </a:r>
+            <a:endParaRPr lang="en-US"/>
+          </a:p>
+          <a:p>
+            <a:r>
+              <a:rPr lang="en-US"/>
+              <a:t>Data Access: Facilitates easy and efficient access to data for queries and transactions.</a:t>
+            </a:r>
+            <a:endParaRPr lang="en-US"/>
+          </a:p>
+          <a:p>
+            <a:r>
+              <a:rPr lang="en-US"/>
+              <a:t>Scalability: Allows databases to scale and handle large volumes of data.</a:t>
+            </a:r>
+            <a:endParaRPr lang="en-US"/>
+          </a:p>
+          <a:p>
+            <a:r>
+              <a:rPr lang="en-US"/>
+              <a:t>Maintenance: Simplifies data management and maintenance over time.</a:t>
+            </a:r>
+            <a:endParaRPr lang="en-US"/>
+          </a:p>
+        </p:txBody>
+      </p:sp>
+    </p:spTree>
+  </p:cSld>
+  <p:clrMapOvr>
+    <a:masterClrMapping/>
+  </p:clrMapOvr>
+</p:sld>
+</file>
+
+<file path=ppt/slides/slide40.xml><?xml version="1.0" encoding="utf-8"?>
+<p:sld xmlns:a="http://schemas.openxmlformats.org/drawingml/2006/main" xmlns:r="http://schemas.openxmlformats.org/officeDocument/2006/relationships" xmlns:p="http://schemas.openxmlformats.org/presentationml/2006/main">
+  <p:cSld>
+    <p:spTree>
+      <p:nvGrpSpPr>
+        <p:cNvPr id="1" name=""/>
+        <p:cNvGrpSpPr/>
+        <p:nvPr/>
+      </p:nvGrpSpPr>
+      <p:grpSpPr/>
+      <p:pic>
+        <p:nvPicPr>
+          <p:cNvPr id="4" name="Picture 3"/>
+          <p:cNvPicPr/>
+          <p:nvPr/>
+        </p:nvPicPr>
+        <p:blipFill>
+          <a:blip r:embed="rId1"/>
+          <a:stretch>
+            <a:fillRect/>
+          </a:stretch>
+        </p:blipFill>
+        <p:spPr>
+          <a:xfrm>
+            <a:off x="2366645" y="71755"/>
+            <a:ext cx="6849110" cy="6595745"/>
+          </a:xfrm>
+          <a:prstGeom prst="rect">
+            <a:avLst/>
+          </a:prstGeom>
+        </p:spPr>
+      </p:pic>
+    </p:spTree>
+  </p:cSld>
+  <p:clrMapOvr>
+    <a:masterClrMapping/>
+  </p:clrMapOvr>
+</p:sld>
+</file>
+
+<file path=ppt/slides/slide41.xml><?xml version="1.0" encoding="utf-8"?>
+<p:sld xmlns:a="http://schemas.openxmlformats.org/drawingml/2006/main" xmlns:r="http://schemas.openxmlformats.org/officeDocument/2006/relationships" xmlns:p="http://schemas.openxmlformats.org/presentationml/2006/main">
+  <p:cSld>
+    <p:spTree>
+      <p:nvGrpSpPr>
+        <p:cNvPr id="1" name=""/>
+        <p:cNvGrpSpPr/>
+        <p:nvPr/>
+      </p:nvGrpSpPr>
+      <p:grpSpPr/>
+      <p:sp>
+        <p:nvSpPr>
+          <p:cNvPr id="2" name="Title 1"/>
+          <p:cNvSpPr>
+            <a:spLocks noGrp="1"/>
+          </p:cNvSpPr>
+          <p:nvPr>
+            <p:ph type="title"/>
+          </p:nvPr>
+        </p:nvSpPr>
+        <p:spPr/>
+        <p:txBody>
+          <a:bodyPr>
+            <a:normAutofit fontScale="90000"/>
+          </a:bodyPr>
+          <a:p>
+            <a:r>
+              <a:rPr lang="en-US" altLang="en-GB"/>
+              <a:t>Find total quantity per customer in the "Produce" category</a:t>
+            </a:r>
+            <a:endParaRPr lang="en-US" altLang="en-GB"/>
+          </a:p>
+        </p:txBody>
+      </p:sp>
+      <p:sp>
+        <p:nvSpPr>
+          <p:cNvPr id="3" name="Content Placeholder 2"/>
+          <p:cNvSpPr>
+            <a:spLocks noGrp="1"/>
+          </p:cNvSpPr>
+          <p:nvPr>
+            <p:ph idx="1"/>
+          </p:nvPr>
+        </p:nvSpPr>
+        <p:spPr/>
+        <p:txBody>
+          <a:bodyPr/>
+          <a:p>
+            <a:pPr marL="0" indent="0">
+              <a:buNone/>
+            </a:pPr>
+            <a:r>
+              <a:rPr lang="en-US" altLang="en-GB"/>
+              <a:t>MATCH (cust:Customer)-[:PURCHASED]-&gt;(:Order)-[o:ORDERS]-&gt;(p:Product),</a:t>
+            </a:r>
+            <a:endParaRPr lang="en-US" altLang="en-GB"/>
+          </a:p>
+          <a:p>
+            <a:pPr marL="0" indent="0">
+              <a:buNone/>
+            </a:pPr>
+            <a:r>
+              <a:rPr lang="en-US" altLang="en-GB"/>
+              <a:t>      (p)-[:PART_OF]-&gt;(c:Category {categoryName:'Produce'})</a:t>
+            </a:r>
+            <a:endParaRPr lang="en-US" altLang="en-GB"/>
+          </a:p>
+          <a:p>
+            <a:pPr marL="0" indent="0">
+              <a:buNone/>
+            </a:pPr>
+            <a:r>
+              <a:rPr lang="en-US" altLang="en-GB"/>
+              <a:t>RETURN cust.contactName as CustomerName,</a:t>
+            </a:r>
+            <a:endParaRPr lang="en-US" altLang="en-GB"/>
+          </a:p>
+          <a:p>
+            <a:pPr marL="0" indent="0">
+              <a:buNone/>
+            </a:pPr>
+            <a:r>
+              <a:rPr lang="en-US" altLang="en-GB"/>
+              <a:t>       sum(o.quantity) AS TotalProductsPurchased</a:t>
+            </a:r>
+            <a:endParaRPr lang="en-US" altLang="en-GB"/>
+          </a:p>
+        </p:txBody>
+      </p:sp>
+    </p:spTree>
+  </p:cSld>
+  <p:clrMapOvr>
+    <a:masterClrMapping/>
+  </p:clrMapOvr>
+</p:sld>
+</file>
+
+<file path=ppt/slides/slide42.xml><?xml version="1.0" encoding="utf-8"?>
+<p:sld xmlns:a="http://schemas.openxmlformats.org/drawingml/2006/main" xmlns:r="http://schemas.openxmlformats.org/officeDocument/2006/relationships" xmlns:p="http://schemas.openxmlformats.org/presentationml/2006/main">
+  <p:cSld>
+    <p:spTree>
+      <p:nvGrpSpPr>
+        <p:cNvPr id="1" name=""/>
+        <p:cNvGrpSpPr/>
+        <p:nvPr/>
+      </p:nvGrpSpPr>
+      <p:grpSpPr/>
+      <p:sp>
+        <p:nvSpPr>
+          <p:cNvPr id="2" name="Title 1"/>
+          <p:cNvSpPr>
+            <a:spLocks noGrp="1"/>
+          </p:cNvSpPr>
+          <p:nvPr>
+            <p:ph type="title"/>
+          </p:nvPr>
+        </p:nvSpPr>
+        <p:spPr/>
+        <p:txBody>
+          <a:bodyPr/>
+          <a:p>
+            <a:r>
+              <a:rPr lang="en-US" altLang="en-GB"/>
+              <a:t>sample datasets </a:t>
+            </a:r>
+            <a:endParaRPr lang="en-US" altLang="en-GB"/>
+          </a:p>
+        </p:txBody>
+      </p:sp>
+      <p:pic>
+        <p:nvPicPr>
+          <p:cNvPr id="4" name="Picture 3"/>
+          <p:cNvPicPr>
+            <a:picLocks noChangeAspect="1"/>
+          </p:cNvPicPr>
+          <p:nvPr/>
+        </p:nvPicPr>
+        <p:blipFill>
+          <a:blip r:embed="rId1"/>
+          <a:stretch>
+            <a:fillRect/>
+          </a:stretch>
+        </p:blipFill>
+        <p:spPr>
+          <a:xfrm>
+            <a:off x="316230" y="1870075"/>
+            <a:ext cx="11559540" cy="4625340"/>
+          </a:xfrm>
+          <a:prstGeom prst="rect">
+            <a:avLst/>
+          </a:prstGeom>
+        </p:spPr>
+      </p:pic>
+    </p:spTree>
+  </p:cSld>
+  <p:clrMapOvr>
+    <a:masterClrMapping/>
+  </p:clrMapOvr>
+</p:sld>
+</file>
+
+<file path=ppt/slides/slide43.xml><?xml version="1.0" encoding="utf-8"?>
+<p:sld xmlns:a="http://schemas.openxmlformats.org/drawingml/2006/main" xmlns:r="http://schemas.openxmlformats.org/officeDocument/2006/relationships" xmlns:p="http://schemas.openxmlformats.org/presentationml/2006/main">
+  <p:cSld>
+    <p:spTree>
+      <p:nvGrpSpPr>
+        <p:cNvPr id="1" name=""/>
+        <p:cNvGrpSpPr/>
+        <p:nvPr/>
+      </p:nvGrpSpPr>
+      <p:grpSpPr/>
+      <p:sp>
+        <p:nvSpPr>
+          <p:cNvPr id="4" name="Title 3"/>
+          <p:cNvSpPr>
+            <a:spLocks noGrp="1"/>
+          </p:cNvSpPr>
+          <p:nvPr>
+            <p:ph type="title"/>
+          </p:nvPr>
+        </p:nvSpPr>
+        <p:spPr/>
+        <p:txBody>
+          <a:bodyPr/>
+          <a:p>
+            <a:r>
+              <a:rPr lang="en-US" altLang="en-GB"/>
+              <a:t>Different data models </a:t>
+            </a:r>
+            <a:endParaRPr lang="en-US" altLang="en-GB"/>
+          </a:p>
+        </p:txBody>
+      </p:sp>
+    </p:spTree>
+  </p:cSld>
+  <p:clrMapOvr>
+    <a:masterClrMapping/>
+  </p:clrMapOvr>
+</p:sld>
+</file>
+
+<file path=ppt/slides/slide44.xml><?xml version="1.0" encoding="utf-8"?>
+<p:sld xmlns:a="http://schemas.openxmlformats.org/drawingml/2006/main" xmlns:r="http://schemas.openxmlformats.org/officeDocument/2006/relationships" xmlns:p="http://schemas.openxmlformats.org/presentationml/2006/main">
+  <p:cSld>
+    <p:spTree>
+      <p:nvGrpSpPr>
+        <p:cNvPr id="1" name=""/>
+        <p:cNvGrpSpPr/>
+        <p:nvPr/>
+      </p:nvGrpSpPr>
+      <p:grpSpPr/>
+      <p:sp>
+        <p:nvSpPr>
+          <p:cNvPr id="3" name="Content Placeholder 2"/>
+          <p:cNvSpPr>
+            <a:spLocks noGrp="1"/>
+          </p:cNvSpPr>
+          <p:nvPr>
+            <p:ph idx="1"/>
+          </p:nvPr>
+        </p:nvSpPr>
+        <p:spPr>
+          <a:xfrm>
+            <a:off x="144145" y="157480"/>
+            <a:ext cx="11920220" cy="6501765"/>
+          </a:xfrm>
+        </p:spPr>
+        <p:txBody>
+          <a:bodyPr>
+            <a:normAutofit fontScale="50000"/>
+          </a:bodyPr>
+          <a:p>
+            <a:pPr marL="0" indent="0">
+              <a:buNone/>
+            </a:pPr>
+            <a:r>
+              <a:rPr lang="en-US" altLang="en-GB"/>
+              <a:t>&lt;Data&gt;</a:t>
+            </a:r>
+            <a:endParaRPr lang="en-US" altLang="en-GB"/>
+          </a:p>
+          <a:p>
+            <a:pPr marL="0" indent="0">
+              <a:buNone/>
+            </a:pPr>
+            <a:r>
+              <a:rPr lang="en-US" altLang="en-GB"/>
+              <a:t>  &lt;Categories&gt;</a:t>
+            </a:r>
+            <a:endParaRPr lang="en-US" altLang="en-GB"/>
+          </a:p>
+          <a:p>
+            <a:pPr marL="0" indent="0">
+              <a:buNone/>
+            </a:pPr>
+            <a:r>
+              <a:rPr lang="en-US" altLang="en-GB"/>
+              <a:t>    &lt;Category id="1" name="Beverages" desc="Soft drinks, coffees, teas, beers, and ales" pic="image_url_or_base64"/&gt;</a:t>
+            </a:r>
+            <a:endParaRPr lang="en-US" altLang="en-GB"/>
+          </a:p>
+          <a:p>
+            <a:pPr marL="0" indent="0">
+              <a:buNone/>
+            </a:pPr>
+            <a:r>
+              <a:rPr lang="en-US" altLang="en-GB"/>
+              <a:t>    &lt;Category id="2" name="Condiments" desc="Sweet and savory sauces, relishes, spreads, and seasonings" pic="image_url_or_base64"/&gt;</a:t>
+            </a:r>
+            <a:endParaRPr lang="en-US" altLang="en-GB"/>
+          </a:p>
+          <a:p>
+            <a:pPr marL="0" indent="0">
+              <a:buNone/>
+            </a:pPr>
+            <a:r>
+              <a:rPr lang="en-US" altLang="en-GB"/>
+              <a:t>  &lt;/Categories&gt;</a:t>
+            </a:r>
+            <a:endParaRPr lang="en-US" altLang="en-GB"/>
+          </a:p>
+          <a:p>
+            <a:pPr marL="0" indent="0">
+              <a:buNone/>
+            </a:pPr>
+            <a:endParaRPr lang="en-US" altLang="en-GB"/>
+          </a:p>
+          <a:p>
+            <a:pPr marL="0" indent="0">
+              <a:buNone/>
+            </a:pPr>
+            <a:r>
+              <a:rPr lang="en-US" altLang="en-GB"/>
+              <a:t>  &lt;Suppliers&gt;</a:t>
+            </a:r>
+            <a:endParaRPr lang="en-US" altLang="en-GB"/>
+          </a:p>
+          <a:p>
+            <a:pPr marL="0" indent="0">
+              <a:buNone/>
+            </a:pPr>
+            <a:r>
+              <a:rPr lang="en-US" altLang="en-GB"/>
+              <a:t>    &lt;Supplier id="1" company="Exotic Liquids" contact="Charlotte Cooper" title="Purchasing Manager" addr="49 Gilbert St." city="London" postal="EC1 4SD" country="UK" phone="(171) 555-2222"/&gt;</a:t>
+            </a:r>
+            <a:endParaRPr lang="en-US" altLang="en-GB"/>
+          </a:p>
+          <a:p>
+            <a:pPr marL="0" indent="0">
+              <a:buNone/>
+            </a:pPr>
+            <a:r>
+              <a:rPr lang="en-US" altLang="en-GB"/>
+              <a:t>    &lt;Supplier id="2" company="New Orleans Cajun Delights" contact="Shelley Burke" title="Order Administrator" addr="P.O. Box 78934" city="New Orleans" region="LA" postal="70117" country="USA" phone="(100) 555-4822"/&gt;</a:t>
+            </a:r>
+            <a:endParaRPr lang="en-US" altLang="en-GB"/>
+          </a:p>
+          <a:p>
+            <a:pPr marL="0" indent="0">
+              <a:buNone/>
+            </a:pPr>
+            <a:r>
+              <a:rPr lang="en-US" altLang="en-GB"/>
+              <a:t>  &lt;/Suppliers&gt;</a:t>
+            </a:r>
+            <a:endParaRPr lang="en-US" altLang="en-GB"/>
+          </a:p>
+          <a:p>
+            <a:pPr marL="0" indent="0">
+              <a:buNone/>
+            </a:pPr>
+            <a:endParaRPr lang="en-US" altLang="en-GB"/>
+          </a:p>
+          <a:p>
+            <a:pPr marL="0" indent="0">
+              <a:buNone/>
+            </a:pPr>
+            <a:r>
+              <a:rPr lang="en-US" altLang="en-GB"/>
+              <a:t>  &lt;Products&gt;</a:t>
+            </a:r>
+            <a:endParaRPr lang="en-US" altLang="en-GB"/>
+          </a:p>
+          <a:p>
+            <a:pPr marL="0" indent="0">
+              <a:buNone/>
+            </a:pPr>
+            <a:r>
+              <a:rPr lang="en-US" altLang="en-GB"/>
+              <a:t>    &lt;Product id="1" name="Chai" catId="1" supId="1" qty="10 boxes x 20 bags" price="18.00" stock="39" order="0" reorder="10" disc="false"/&gt;</a:t>
+            </a:r>
+            <a:endParaRPr lang="en-US" altLang="en-GB"/>
+          </a:p>
+          <a:p>
+            <a:pPr marL="0" indent="0">
+              <a:buNone/>
+            </a:pPr>
+            <a:r>
+              <a:rPr lang="en-US" altLang="en-GB"/>
+              <a:t>    &lt;Product id="2" name="Chang" catId="1" supId="1" qty="24 - 12 oz bottles" price="19.00" stock="17" order="40" reorder="25" disc="false"/&gt;</a:t>
+            </a:r>
+            <a:endParaRPr lang="en-US" altLang="en-GB"/>
+          </a:p>
+          <a:p>
+            <a:pPr marL="0" indent="0">
+              <a:buNone/>
+            </a:pPr>
+            <a:r>
+              <a:rPr lang="en-US" altLang="en-GB"/>
+              <a:t>  &lt;/Products&gt;</a:t>
+            </a:r>
+            <a:endParaRPr lang="en-US" altLang="en-GB"/>
+          </a:p>
+          <a:p>
+            <a:pPr marL="0" indent="0">
+              <a:buNone/>
+            </a:pPr>
+            <a:r>
+              <a:rPr lang="en-US" altLang="en-GB"/>
+              <a:t>&lt;/Data&gt;</a:t>
+            </a:r>
+            <a:endParaRPr lang="en-US" altLang="en-GB"/>
+          </a:p>
+          <a:p>
+            <a:pPr marL="0" indent="0">
+              <a:buNone/>
+            </a:pPr>
+            <a:endParaRPr lang="en-US" altLang="en-GB"/>
+          </a:p>
+        </p:txBody>
+      </p:sp>
+    </p:spTree>
+  </p:cSld>
+  <p:clrMapOvr>
+    <a:masterClrMapping/>
+  </p:clrMapOvr>
+</p:sld>
+</file>
+
+<file path=ppt/slides/slide45.xml><?xml version="1.0" encoding="utf-8"?>
+<p:sld xmlns:a="http://schemas.openxmlformats.org/drawingml/2006/main" xmlns:r="http://schemas.openxmlformats.org/officeDocument/2006/relationships" xmlns:p="http://schemas.openxmlformats.org/presentationml/2006/main">
+  <p:cSld>
+    <p:spTree>
+      <p:nvGrpSpPr>
+        <p:cNvPr id="1" name=""/>
+        <p:cNvGrpSpPr/>
+        <p:nvPr/>
+      </p:nvGrpSpPr>
+      <p:grpSpPr/>
+      <p:sp>
+        <p:nvSpPr>
+          <p:cNvPr id="3" name="Content Placeholder 2"/>
+          <p:cNvSpPr>
+            <a:spLocks noGrp="1"/>
+          </p:cNvSpPr>
+          <p:nvPr>
+            <p:ph idx="1"/>
+          </p:nvPr>
+        </p:nvSpPr>
+        <p:spPr>
+          <a:xfrm>
+            <a:off x="838200" y="301625"/>
+            <a:ext cx="10811510" cy="5875655"/>
+          </a:xfrm>
+        </p:spPr>
+        <p:txBody>
+          <a:bodyPr>
+            <a:noAutofit/>
+          </a:bodyPr>
+          <a:p>
+            <a:pPr marL="0" indent="0">
+              <a:buNone/>
+            </a:pPr>
+            <a:r>
+              <a:rPr lang="en-US" altLang="en-GB" sz="1400"/>
+              <a:t>{</a:t>
+            </a:r>
+            <a:endParaRPr lang="en-US" altLang="en-GB" sz="1400"/>
+          </a:p>
+          <a:p>
+            <a:pPr marL="0" indent="0">
+              <a:buNone/>
+            </a:pPr>
+            <a:r>
+              <a:rPr lang="en-US" altLang="en-GB" sz="1400"/>
+              <a:t>  "Categories": [</a:t>
+            </a:r>
+            <a:endParaRPr lang="en-US" altLang="en-GB" sz="1400"/>
+          </a:p>
+          <a:p>
+            <a:pPr marL="0" indent="0">
+              <a:buNone/>
+            </a:pPr>
+            <a:r>
+              <a:rPr lang="en-US" altLang="en-GB" sz="1400"/>
+              <a:t>    { "CategoryID": 1, "CategoryName": "Beverages", "Description": "Soft drinks, coffees, teas, beers, and ales", "Picture": "image_url_or_base64" },</a:t>
+            </a:r>
+            <a:endParaRPr lang="en-US" altLang="en-GB" sz="1400"/>
+          </a:p>
+          <a:p>
+            <a:pPr marL="0" indent="0">
+              <a:buNone/>
+            </a:pPr>
+            <a:r>
+              <a:rPr lang="en-US" altLang="en-GB" sz="1400"/>
+              <a:t>    { "CategoryID": 2, "CategoryName": "Condiments", "Description": "Sweet and savory sauces, relishes, spreads, and seasonings", "Picture": "image_url_or_base64" }</a:t>
+            </a:r>
+            <a:endParaRPr lang="en-US" altLang="en-GB" sz="1400"/>
+          </a:p>
+          <a:p>
+            <a:pPr marL="0" indent="0">
+              <a:buNone/>
+            </a:pPr>
+            <a:r>
+              <a:rPr lang="en-US" altLang="en-GB" sz="1400"/>
+              <a:t>  ],</a:t>
+            </a:r>
+            <a:endParaRPr lang="en-US" altLang="en-GB" sz="1400"/>
+          </a:p>
+          <a:p>
+            <a:pPr marL="0" indent="0">
+              <a:buNone/>
+            </a:pPr>
+            <a:r>
+              <a:rPr lang="en-US" altLang="en-GB" sz="1400"/>
+              <a:t>  "Suppliers": [</a:t>
+            </a:r>
+            <a:endParaRPr lang="en-US" altLang="en-GB" sz="1400"/>
+          </a:p>
+          <a:p>
+            <a:pPr marL="0" indent="0">
+              <a:buNone/>
+            </a:pPr>
+            <a:r>
+              <a:rPr lang="en-US" altLang="en-GB" sz="1400"/>
+              <a:t>    { "SupplierID": 1, "CompanyName": "Exotic Liquids", "ContactName": "Charlotte Cooper", "ContactTitle": "Purchasing Manager", "Address": "49 Gilbert St.", "City": "London", "Region": null, "PostalCode": "EC1 4SD", "Country": "UK", "Phone": "(171) 555-2222", "Fax": null, "HomePage": null },</a:t>
+            </a:r>
+            <a:endParaRPr lang="en-US" altLang="en-GB" sz="1400"/>
+          </a:p>
+          <a:p>
+            <a:pPr marL="0" indent="0">
+              <a:buNone/>
+            </a:pPr>
+            <a:r>
+              <a:rPr lang="en-US" altLang="en-GB" sz="1400"/>
+              <a:t>    { "SupplierID": 2, "CompanyName": "New Orleans Cajun Delights", "ContactName": "Shelley Burke", "ContactTitle": "Order Administrator", "Address": "P.O. Box 78934", "City": "New Orleans", "Region": "LA", "PostalCode": "70117", "Country": "USA", "Phone": "(100) 555-4822", "Fax": null, "HomePage": null }</a:t>
+            </a:r>
+            <a:endParaRPr lang="en-US" altLang="en-GB" sz="1400"/>
+          </a:p>
+          <a:p>
+            <a:pPr marL="0" indent="0">
+              <a:buNone/>
+            </a:pPr>
+            <a:r>
+              <a:rPr lang="en-US" altLang="en-GB" sz="1400"/>
+              <a:t>  ],</a:t>
+            </a:r>
+            <a:endParaRPr lang="en-US" altLang="en-GB" sz="1400"/>
+          </a:p>
+          <a:p>
+            <a:pPr marL="0" indent="0">
+              <a:buNone/>
+            </a:pPr>
+            <a:r>
+              <a:rPr lang="en-US" altLang="en-GB" sz="1400"/>
+              <a:t>  "Products": [</a:t>
+            </a:r>
+            <a:endParaRPr lang="en-US" altLang="en-GB" sz="1400"/>
+          </a:p>
+          <a:p>
+            <a:pPr marL="0" indent="0">
+              <a:buNone/>
+            </a:pPr>
+            <a:r>
+              <a:rPr lang="en-US" altLang="en-GB" sz="1400"/>
+              <a:t>    { "ProductID": 1, "ProductName": "Chai", "CategoryID": 1, "SupplierID": 1, "QuantityPerUnit": "10 boxes x 20 bags", "UnitPrice": 18.00, "UnitsInStock": 39, "UnitsOnOrder": 0, "ReorderLevel": 10, "Discontinued": false },</a:t>
+            </a:r>
+            <a:endParaRPr lang="en-US" altLang="en-GB" sz="1400"/>
+          </a:p>
+          <a:p>
+            <a:pPr marL="0" indent="0">
+              <a:buNone/>
+            </a:pPr>
+            <a:r>
+              <a:rPr lang="en-US" altLang="en-GB" sz="1400"/>
+              <a:t>    { "ProductID": 2, "ProductName": "Chang", "CategoryID": 1, "SupplierID": 1, "QuantityPerUnit": "24 - 12 oz bottles", "UnitPrice": 19.00, "UnitsInStock": 17, "UnitsOnOrder": 40, "ReorderLevel": 25, "Discontinued": false }</a:t>
+            </a:r>
+            <a:endParaRPr lang="en-US" altLang="en-GB" sz="1400"/>
+          </a:p>
+          <a:p>
+            <a:pPr marL="0" indent="0">
+              <a:buNone/>
+            </a:pPr>
+            <a:r>
+              <a:rPr lang="en-US" altLang="en-GB" sz="1400"/>
+              <a:t>  ]</a:t>
+            </a:r>
+            <a:endParaRPr lang="en-US" altLang="en-GB" sz="1400"/>
+          </a:p>
+          <a:p>
+            <a:pPr marL="0" indent="0">
+              <a:buNone/>
+            </a:pPr>
+            <a:r>
+              <a:rPr lang="en-US" altLang="en-GB" sz="1400"/>
+              <a:t>}</a:t>
+            </a:r>
+            <a:endParaRPr lang="en-US" altLang="en-GB" sz="1400"/>
+          </a:p>
+          <a:p>
+            <a:pPr marL="0" indent="0">
+              <a:buNone/>
+            </a:pPr>
+            <a:endParaRPr lang="en-US" altLang="en-GB" sz="1400"/>
+          </a:p>
+        </p:txBody>
+      </p:sp>
+    </p:spTree>
+  </p:cSld>
+  <p:clrMapOvr>
+    <a:masterClrMapping/>
+  </p:clrMapOvr>
+</p:sld>
+</file>
+
+<file path=ppt/slides/slide46.xml><?xml version="1.0" encoding="utf-8"?>
+<p:sld xmlns:a="http://schemas.openxmlformats.org/drawingml/2006/main" xmlns:r="http://schemas.openxmlformats.org/officeDocument/2006/relationships" xmlns:p="http://schemas.openxmlformats.org/presentationml/2006/main">
+  <p:cSld>
+    <p:spTree>
+      <p:nvGrpSpPr>
+        <p:cNvPr id="1" name=""/>
+        <p:cNvGrpSpPr/>
+        <p:nvPr/>
+      </p:nvGrpSpPr>
+      <p:grpSpPr/>
+      <p:sp>
+        <p:nvSpPr>
+          <p:cNvPr id="2" name="Title 1"/>
+          <p:cNvSpPr>
+            <a:spLocks noGrp="1"/>
+          </p:cNvSpPr>
+          <p:nvPr>
+            <p:ph type="title"/>
+          </p:nvPr>
+        </p:nvSpPr>
+        <p:spPr/>
+        <p:txBody>
+          <a:bodyPr>
+            <a:normAutofit fontScale="90000"/>
+          </a:bodyPr>
+          <a:p>
+            <a:r>
+              <a:rPr lang="en-US" altLang="en-GB"/>
+              <a:t>from relation data model to graph data model</a:t>
+            </a:r>
+            <a:br>
+              <a:rPr lang="en-US" altLang="en-GB"/>
+            </a:br>
+            <a:r>
+              <a:rPr lang="en-US" altLang="en-GB"/>
+              <a:t>Northwind data  </a:t>
+            </a:r>
+            <a:endParaRPr lang="en-US" altLang="en-GB"/>
+          </a:p>
+        </p:txBody>
+      </p:sp>
+      <p:pic>
+        <p:nvPicPr>
+          <p:cNvPr id="4" name="Picture 3"/>
+          <p:cNvPicPr/>
+          <p:nvPr/>
+        </p:nvPicPr>
+        <p:blipFill>
+          <a:blip r:embed="rId1"/>
+          <a:stretch>
+            <a:fillRect/>
+          </a:stretch>
+        </p:blipFill>
+        <p:spPr>
+          <a:xfrm>
+            <a:off x="318770" y="2019300"/>
+            <a:ext cx="4747260" cy="4174490"/>
+          </a:xfrm>
+          <a:prstGeom prst="rect">
+            <a:avLst/>
+          </a:prstGeom>
+        </p:spPr>
+      </p:pic>
+      <p:pic>
+        <p:nvPicPr>
+          <p:cNvPr id="5" name="Picture 4"/>
+          <p:cNvPicPr/>
+          <p:nvPr/>
+        </p:nvPicPr>
+        <p:blipFill>
+          <a:blip r:embed="rId2"/>
+          <a:stretch>
+            <a:fillRect/>
+          </a:stretch>
+        </p:blipFill>
+        <p:spPr>
+          <a:xfrm>
+            <a:off x="5979795" y="2019300"/>
+            <a:ext cx="4779010" cy="4173855"/>
+          </a:xfrm>
+          <a:prstGeom prst="rect">
+            <a:avLst/>
+          </a:prstGeom>
+        </p:spPr>
+      </p:pic>
+    </p:spTree>
+  </p:cSld>
+  <p:clrMapOvr>
+    <a:masterClrMapping/>
+  </p:clrMapOvr>
+</p:sld>
+</file>
+
+<file path=ppt/slides/slide47.xml><?xml version="1.0" encoding="utf-8"?>
+<p:sld xmlns:a="http://schemas.openxmlformats.org/drawingml/2006/main" xmlns:r="http://schemas.openxmlformats.org/officeDocument/2006/relationships" xmlns:p="http://schemas.openxmlformats.org/presentationml/2006/main">
+  <p:cSld>
+    <p:spTree>
+      <p:nvGrpSpPr>
+        <p:cNvPr id="1" name=""/>
+        <p:cNvGrpSpPr/>
+        <p:nvPr/>
+      </p:nvGrpSpPr>
+      <p:grpSpPr/>
+      <p:sp>
+        <p:nvSpPr>
+          <p:cNvPr id="2" name="Title 1"/>
+          <p:cNvSpPr>
+            <a:spLocks noGrp="1"/>
+          </p:cNvSpPr>
+          <p:nvPr>
+            <p:ph type="title"/>
+          </p:nvPr>
+        </p:nvSpPr>
+        <p:spPr/>
+        <p:txBody>
           <a:bodyPr/>
           <a:p>
             <a:r>
@@ -7444,105 +8673,6 @@
           </a:ln>
         </p:spPr>
       </p:pic>
-    </p:spTree>
-  </p:cSld>
-  <p:clrMapOvr>
-    <a:masterClrMapping/>
-  </p:clrMapOvr>
-</p:sld>
-</file>
-
-<file path=ppt/slides/slide4.xml><?xml version="1.0" encoding="utf-8"?>
-<p:sld xmlns:a="http://schemas.openxmlformats.org/drawingml/2006/main" xmlns:r="http://schemas.openxmlformats.org/officeDocument/2006/relationships" xmlns:p="http://schemas.openxmlformats.org/presentationml/2006/main">
-  <p:cSld>
-    <p:spTree>
-      <p:nvGrpSpPr>
-        <p:cNvPr id="1" name=""/>
-        <p:cNvGrpSpPr/>
-        <p:nvPr/>
-      </p:nvGrpSpPr>
-      <p:grpSpPr/>
-      <p:sp>
-        <p:nvSpPr>
-          <p:cNvPr id="2" name="Title 1"/>
-          <p:cNvSpPr>
-            <a:spLocks noGrp="1"/>
-          </p:cNvSpPr>
-          <p:nvPr>
-            <p:ph type="title"/>
-          </p:nvPr>
-        </p:nvSpPr>
-        <p:spPr/>
-        <p:txBody>
-          <a:bodyPr/>
-          <a:p>
-            <a:r>
-              <a:rPr lang="en-US">
-                <a:sym typeface="+mn-ea"/>
-              </a:rPr>
-              <a:t>Importance of Data Models</a:t>
-            </a:r>
-            <a:endParaRPr lang="en-US"/>
-          </a:p>
-        </p:txBody>
-      </p:sp>
-      <p:sp>
-        <p:nvSpPr>
-          <p:cNvPr id="3" name="Content Placeholder 2"/>
-          <p:cNvSpPr>
-            <a:spLocks noGrp="1"/>
-          </p:cNvSpPr>
-          <p:nvPr>
-            <p:ph idx="1"/>
-          </p:nvPr>
-        </p:nvSpPr>
-        <p:spPr>
-          <a:xfrm>
-            <a:off x="838200" y="1825625"/>
-            <a:ext cx="10929620" cy="4351655"/>
-          </a:xfrm>
-        </p:spPr>
-        <p:txBody>
-          <a:bodyPr>
-            <a:normAutofit lnSpcReduction="10000"/>
-          </a:bodyPr>
-          <a:p>
-            <a:r>
-              <a:rPr lang="en-US"/>
-              <a:t>Data Organization: Helps in organizing and structuring data efficiently.</a:t>
-            </a:r>
-            <a:endParaRPr lang="en-US"/>
-          </a:p>
-          <a:p>
-            <a:r>
-              <a:rPr lang="en-US"/>
-              <a:t>Data Integrity: Ensures the accuracy and consistency of data through constraints and rules.</a:t>
-            </a:r>
-            <a:endParaRPr lang="en-US"/>
-          </a:p>
-          <a:p>
-            <a:r>
-              <a:rPr lang="en-US"/>
-              <a:t>Data Access: Facilitates easy and efficient access to data for queries and transactions.</a:t>
-            </a:r>
-            <a:endParaRPr lang="en-US"/>
-          </a:p>
-          <a:p>
-            <a:r>
-              <a:rPr lang="en-US"/>
-              <a:t>Scalability: Allows databases to scale and handle large volumes of data.</a:t>
-            </a:r>
-            <a:endParaRPr lang="en-US"/>
-          </a:p>
-          <a:p>
-            <a:r>
-              <a:rPr lang="en-US"/>
-              <a:t>Maintenance: Simplifies data management and maintenance over time.</a:t>
-            </a:r>
-            <a:endParaRPr lang="en-US"/>
-          </a:p>
-        </p:txBody>
-      </p:sp>
     </p:spTree>
   </p:cSld>
   <p:clrMapOvr>

</xml_diff>